<commit_message>
bao cao de cuong
</commit_message>
<xml_diff>
--- a/de cuong.pptx
+++ b/de cuong.pptx
@@ -5,7 +5,7 @@
     <p:sldMasterId id="2147483648" r:id="rId1"/>
   </p:sldMasterIdLst>
   <p:notesMasterIdLst>
-    <p:notesMasterId r:id="rId19"/>
+    <p:notesMasterId r:id="rId21"/>
   </p:notesMasterIdLst>
   <p:sldIdLst>
     <p:sldId id="256" r:id="rId2"/>
@@ -15,16 +15,18 @@
     <p:sldId id="260" r:id="rId6"/>
     <p:sldId id="272" r:id="rId7"/>
     <p:sldId id="273" r:id="rId8"/>
-    <p:sldId id="270" r:id="rId9"/>
-    <p:sldId id="261" r:id="rId10"/>
-    <p:sldId id="262" r:id="rId11"/>
-    <p:sldId id="263" r:id="rId12"/>
-    <p:sldId id="264" r:id="rId13"/>
-    <p:sldId id="265" r:id="rId14"/>
-    <p:sldId id="271" r:id="rId15"/>
-    <p:sldId id="266" r:id="rId16"/>
-    <p:sldId id="267" r:id="rId17"/>
-    <p:sldId id="268" r:id="rId18"/>
+    <p:sldId id="274" r:id="rId9"/>
+    <p:sldId id="270" r:id="rId10"/>
+    <p:sldId id="261" r:id="rId11"/>
+    <p:sldId id="262" r:id="rId12"/>
+    <p:sldId id="263" r:id="rId13"/>
+    <p:sldId id="264" r:id="rId14"/>
+    <p:sldId id="275" r:id="rId15"/>
+    <p:sldId id="265" r:id="rId16"/>
+    <p:sldId id="266" r:id="rId17"/>
+    <p:sldId id="267" r:id="rId18"/>
+    <p:sldId id="276" r:id="rId19"/>
+    <p:sldId id="268" r:id="rId20"/>
   </p:sldIdLst>
   <p:sldSz cx="9144000" cy="6858000" type="screen4x3"/>
   <p:notesSz cx="6858000" cy="9144000"/>
@@ -208,7 +210,7 @@
           <a:p>
             <a:fld id="{A0ECE10E-C11D-46D0-9348-852C37C25C73}" type="datetimeFigureOut">
               <a:rPr lang="en-US" smtClean="0"/>
-              <a:t>1/2/2016</a:t>
+              <a:t>1/3/2016</a:t>
             </a:fld>
             <a:endParaRPr lang="en-US"/>
           </a:p>
@@ -1044,7 +1046,7 @@
           <a:p>
             <a:fld id="{20D66BA9-A7A5-48EE-99D3-AC0A6436BFE6}" type="datetime1">
               <a:rPr lang="en-US" smtClean="0"/>
-              <a:t>1/2/2016</a:t>
+              <a:t>1/3/2016</a:t>
             </a:fld>
             <a:endParaRPr lang="en-US"/>
           </a:p>
@@ -1214,7 +1216,7 @@
           <a:p>
             <a:fld id="{A9036A1F-B6E8-4F66-BFF2-CE11CFBA46FB}" type="datetime1">
               <a:rPr lang="en-US" smtClean="0"/>
-              <a:t>1/2/2016</a:t>
+              <a:t>1/3/2016</a:t>
             </a:fld>
             <a:endParaRPr lang="en-US"/>
           </a:p>
@@ -1394,7 +1396,7 @@
           <a:p>
             <a:fld id="{E5F1ABFF-EEF9-4F38-974A-5D5221898A55}" type="datetime1">
               <a:rPr lang="en-US" smtClean="0"/>
-              <a:t>1/2/2016</a:t>
+              <a:t>1/3/2016</a:t>
             </a:fld>
             <a:endParaRPr lang="en-US"/>
           </a:p>
@@ -1564,7 +1566,7 @@
           <a:p>
             <a:fld id="{97E3D1E1-2F7E-4B0E-9B9E-B046A89C613E}" type="datetime1">
               <a:rPr lang="en-US" smtClean="0"/>
-              <a:t>1/2/2016</a:t>
+              <a:t>1/3/2016</a:t>
             </a:fld>
             <a:endParaRPr lang="en-US"/>
           </a:p>
@@ -1810,7 +1812,7 @@
           <a:p>
             <a:fld id="{DC49E661-A691-4108-9D1C-9EF54F761836}" type="datetime1">
               <a:rPr lang="en-US" smtClean="0"/>
-              <a:t>1/2/2016</a:t>
+              <a:t>1/3/2016</a:t>
             </a:fld>
             <a:endParaRPr lang="en-US"/>
           </a:p>
@@ -2098,7 +2100,7 @@
           <a:p>
             <a:fld id="{8047CCC1-0389-41CB-90DA-C992FAB79BD8}" type="datetime1">
               <a:rPr lang="en-US" smtClean="0"/>
-              <a:t>1/2/2016</a:t>
+              <a:t>1/3/2016</a:t>
             </a:fld>
             <a:endParaRPr lang="en-US"/>
           </a:p>
@@ -2520,7 +2522,7 @@
           <a:p>
             <a:fld id="{862A2FA6-9C25-4148-8158-C30550529211}" type="datetime1">
               <a:rPr lang="en-US" smtClean="0"/>
-              <a:t>1/2/2016</a:t>
+              <a:t>1/3/2016</a:t>
             </a:fld>
             <a:endParaRPr lang="en-US"/>
           </a:p>
@@ -2638,7 +2640,7 @@
           <a:p>
             <a:fld id="{69016018-964C-47C0-9864-D7312E695E27}" type="datetime1">
               <a:rPr lang="en-US" smtClean="0"/>
-              <a:t>1/2/2016</a:t>
+              <a:t>1/3/2016</a:t>
             </a:fld>
             <a:endParaRPr lang="en-US"/>
           </a:p>
@@ -2733,7 +2735,7 @@
           <a:p>
             <a:fld id="{1C4A9066-39B3-46C3-9491-FABBDE1EBF72}" type="datetime1">
               <a:rPr lang="en-US" smtClean="0"/>
-              <a:t>1/2/2016</a:t>
+              <a:t>1/3/2016</a:t>
             </a:fld>
             <a:endParaRPr lang="en-US"/>
           </a:p>
@@ -3010,7 +3012,7 @@
           <a:p>
             <a:fld id="{9E87ED64-FE90-4247-9009-AF106DEC3674}" type="datetime1">
               <a:rPr lang="en-US" smtClean="0"/>
-              <a:t>1/2/2016</a:t>
+              <a:t>1/3/2016</a:t>
             </a:fld>
             <a:endParaRPr lang="en-US"/>
           </a:p>
@@ -3263,7 +3265,7 @@
           <a:p>
             <a:fld id="{08FF1673-7C8A-4391-A959-C8E0B0B84977}" type="datetime1">
               <a:rPr lang="en-US" smtClean="0"/>
-              <a:t>1/2/2016</a:t>
+              <a:t>1/3/2016</a:t>
             </a:fld>
             <a:endParaRPr lang="en-US"/>
           </a:p>
@@ -3476,7 +3478,7 @@
           <a:p>
             <a:fld id="{DD133F4C-4E9C-4598-B9C3-E8A29A8F47D9}" type="datetime1">
               <a:rPr lang="en-US" smtClean="0"/>
-              <a:t>1/2/2016</a:t>
+              <a:t>1/3/2016</a:t>
             </a:fld>
             <a:endParaRPr lang="en-US"/>
           </a:p>
@@ -4014,6 +4016,156 @@
           <a:p>
             <a:r>
               <a:rPr lang="en-US" smtClean="0"/>
+              <a:t>2. Mục tiêu nghiên cứu</a:t>
+            </a:r>
+            <a:endParaRPr lang="en-US"/>
+          </a:p>
+        </p:txBody>
+      </p:sp>
+      <p:sp>
+        <p:nvSpPr>
+          <p:cNvPr id="3" name="Content Placeholder 2"/>
+          <p:cNvSpPr>
+            <a:spLocks noGrp="1"/>
+          </p:cNvSpPr>
+          <p:nvPr>
+            <p:ph idx="1"/>
+          </p:nvPr>
+        </p:nvSpPr>
+        <p:spPr/>
+        <p:txBody>
+          <a:bodyPr/>
+          <a:lstStyle/>
+          <a:p>
+            <a:pPr marL="514350" indent="-514350">
+              <a:buAutoNum type="arabicPeriod"/>
+            </a:pPr>
+            <a:r>
+              <a:rPr lang="en-US" smtClean="0"/>
+              <a:t>Xác định tuyến đường mà xe đang đi dựa vào dữ liệu GPS thu được từ điện thoại di động</a:t>
+            </a:r>
+          </a:p>
+          <a:p>
+            <a:pPr marL="514350" indent="-514350">
+              <a:buAutoNum type="arabicPeriod"/>
+            </a:pPr>
+            <a:r>
+              <a:rPr lang="en-US" smtClean="0"/>
+              <a:t>Xây dựng hệ thống dẫn đường thời gian thực</a:t>
+            </a:r>
+          </a:p>
+          <a:p>
+            <a:pPr marL="514350" indent="-514350">
+              <a:buAutoNum type="arabicPeriod"/>
+            </a:pPr>
+            <a:r>
+              <a:rPr lang="en-US" smtClean="0"/>
+              <a:t>Xây dựng ứng dụng dẫn đường trên Android</a:t>
+            </a:r>
+          </a:p>
+        </p:txBody>
+      </p:sp>
+      <p:sp>
+        <p:nvSpPr>
+          <p:cNvPr id="6" name="Footer Placeholder 5"/>
+          <p:cNvSpPr>
+            <a:spLocks noGrp="1"/>
+          </p:cNvSpPr>
+          <p:nvPr>
+            <p:ph type="ftr" sz="quarter" idx="11"/>
+          </p:nvPr>
+        </p:nvSpPr>
+        <p:spPr/>
+        <p:txBody>
+          <a:bodyPr/>
+          <a:lstStyle/>
+          <a:p>
+            <a:r>
+              <a:rPr lang="vi-VN" smtClean="0"/>
+              <a:t>Lưu Văn Diệp - Đề cương cao học</a:t>
+            </a:r>
+            <a:endParaRPr lang="en-US"/>
+          </a:p>
+        </p:txBody>
+      </p:sp>
+      <p:sp>
+        <p:nvSpPr>
+          <p:cNvPr id="7" name="Slide Number Placeholder 6"/>
+          <p:cNvSpPr>
+            <a:spLocks noGrp="1"/>
+          </p:cNvSpPr>
+          <p:nvPr>
+            <p:ph type="sldNum" sz="quarter" idx="12"/>
+          </p:nvPr>
+        </p:nvSpPr>
+        <p:spPr/>
+        <p:txBody>
+          <a:bodyPr/>
+          <a:lstStyle/>
+          <a:p>
+            <a:fld id="{B6F15528-21DE-4FAA-801E-634DDDAF4B2B}" type="slidenum">
+              <a:rPr lang="en-US" smtClean="0"/>
+              <a:pPr/>
+              <a:t>10</a:t>
+            </a:fld>
+            <a:endParaRPr lang="en-US"/>
+          </a:p>
+        </p:txBody>
+      </p:sp>
+    </p:spTree>
+    <p:extLst>
+      <p:ext uri="{BB962C8B-B14F-4D97-AF65-F5344CB8AC3E}">
+        <p14:creationId xmlns:p14="http://schemas.microsoft.com/office/powerpoint/2010/main" val="1145428285"/>
+      </p:ext>
+    </p:extLst>
+  </p:cSld>
+  <p:clrMapOvr>
+    <a:masterClrMapping/>
+  </p:clrMapOvr>
+  <p:timing>
+    <p:tnLst>
+      <p:par>
+        <p:cTn id="1" dur="indefinite" restart="never" nodeType="tmRoot"/>
+      </p:par>
+    </p:tnLst>
+  </p:timing>
+</p:sld>
+</file>
+
+<file path=ppt/slides/slide11.xml><?xml version="1.0" encoding="utf-8"?>
+<p:sld xmlns:a="http://schemas.openxmlformats.org/drawingml/2006/main" xmlns:r="http://schemas.openxmlformats.org/officeDocument/2006/relationships" xmlns:p="http://schemas.openxmlformats.org/presentationml/2006/main">
+  <p:cSld>
+    <p:spTree>
+      <p:nvGrpSpPr>
+        <p:cNvPr id="1" name=""/>
+        <p:cNvGrpSpPr/>
+        <p:nvPr/>
+      </p:nvGrpSpPr>
+      <p:grpSpPr>
+        <a:xfrm>
+          <a:off x="0" y="0"/>
+          <a:ext cx="0" cy="0"/>
+          <a:chOff x="0" y="0"/>
+          <a:chExt cx="0" cy="0"/>
+        </a:xfrm>
+      </p:grpSpPr>
+      <p:sp>
+        <p:nvSpPr>
+          <p:cNvPr id="2" name="Title 1"/>
+          <p:cNvSpPr>
+            <a:spLocks noGrp="1"/>
+          </p:cNvSpPr>
+          <p:nvPr>
+            <p:ph type="title"/>
+          </p:nvPr>
+        </p:nvSpPr>
+        <p:spPr/>
+        <p:txBody>
+          <a:bodyPr/>
+          <a:lstStyle/>
+          <a:p>
+            <a:r>
+              <a:rPr lang="en-US" smtClean="0"/>
               <a:t>3. Phương pháp nghiên cứu</a:t>
             </a:r>
             <a:endParaRPr lang="en-US"/>
@@ -4153,7 +4305,7 @@
             <a:fld id="{B6F15528-21DE-4FAA-801E-634DDDAF4B2B}" type="slidenum">
               <a:rPr lang="en-US" smtClean="0"/>
               <a:pPr/>
-              <a:t>10</a:t>
+              <a:t>11</a:t>
             </a:fld>
             <a:endParaRPr lang="en-US"/>
           </a:p>
@@ -4349,7 +4501,7 @@
 </p:sld>
 </file>
 
-<file path=ppt/slides/slide11.xml><?xml version="1.0" encoding="utf-8"?>
+<file path=ppt/slides/slide12.xml><?xml version="1.0" encoding="utf-8"?>
 <p:sld xmlns:a="http://schemas.openxmlformats.org/drawingml/2006/main" xmlns:r="http://schemas.openxmlformats.org/officeDocument/2006/relationships" xmlns:p="http://schemas.openxmlformats.org/presentationml/2006/main">
   <p:cSld>
     <p:spTree>
@@ -4534,7 +4686,7 @@
             <a:fld id="{B6F15528-21DE-4FAA-801E-634DDDAF4B2B}" type="slidenum">
               <a:rPr lang="en-US" smtClean="0"/>
               <a:pPr/>
-              <a:t>11</a:t>
+              <a:t>12</a:t>
             </a:fld>
             <a:endParaRPr lang="en-US"/>
           </a:p>
@@ -4730,7 +4882,7 @@
 </p:sld>
 </file>
 
-<file path=ppt/slides/slide12.xml><?xml version="1.0" encoding="utf-8"?>
+<file path=ppt/slides/slide13.xml><?xml version="1.0" encoding="utf-8"?>
 <p:sld xmlns:a="http://schemas.openxmlformats.org/drawingml/2006/main" xmlns:r="http://schemas.openxmlformats.org/officeDocument/2006/relationships" xmlns:p="http://schemas.openxmlformats.org/presentationml/2006/main">
   <p:cSld>
     <p:spTree>
@@ -4889,7 +5041,7 @@
             <a:fld id="{B6F15528-21DE-4FAA-801E-634DDDAF4B2B}" type="slidenum">
               <a:rPr lang="en-US" smtClean="0"/>
               <a:pPr/>
-              <a:t>12</a:t>
+              <a:t>13</a:t>
             </a:fld>
             <a:endParaRPr lang="en-US"/>
           </a:p>
@@ -5085,7 +5237,7 @@
 </p:sld>
 </file>
 
-<file path=ppt/slides/slide13.xml><?xml version="1.0" encoding="utf-8"?>
+<file path=ppt/slides/slide14.xml><?xml version="1.0" encoding="utf-8"?>
 <p:sld xmlns:a="http://schemas.openxmlformats.org/drawingml/2006/main" xmlns:r="http://schemas.openxmlformats.org/officeDocument/2006/relationships" xmlns:p="http://schemas.openxmlformats.org/presentationml/2006/main">
   <p:cSld>
     <p:spTree>
@@ -5118,6 +5270,149 @@
           <a:lstStyle/>
           <a:p>
             <a:r>
+              <a:rPr lang="en-US"/>
+              <a:t>3. Phương pháp nghiên cứu</a:t>
+            </a:r>
+          </a:p>
+        </p:txBody>
+      </p:sp>
+      <p:sp>
+        <p:nvSpPr>
+          <p:cNvPr id="3" name="Content Placeholder 2"/>
+          <p:cNvSpPr>
+            <a:spLocks noGrp="1"/>
+          </p:cNvSpPr>
+          <p:nvPr>
+            <p:ph idx="1"/>
+          </p:nvPr>
+        </p:nvSpPr>
+        <p:spPr/>
+        <p:txBody>
+          <a:bodyPr/>
+          <a:lstStyle/>
+          <a:p>
+            <a:r>
+              <a:rPr lang="en-US" smtClean="0"/>
+              <a:t>Vấn đề về dữ liệu</a:t>
+            </a:r>
+          </a:p>
+          <a:p>
+            <a:pPr lvl="1"/>
+            <a:r>
+              <a:rPr lang="en-US" smtClean="0"/>
+              <a:t>Khoảng thời gian giữa các lần lấy GPS (interval)</a:t>
+            </a:r>
+          </a:p>
+          <a:p>
+            <a:pPr lvl="1"/>
+            <a:r>
+              <a:rPr lang="en-US" smtClean="0"/>
+              <a:t>Thông tin cần thiết cho quá trình xử lý</a:t>
+            </a:r>
+            <a:endParaRPr lang="en-US"/>
+          </a:p>
+        </p:txBody>
+      </p:sp>
+      <p:sp>
+        <p:nvSpPr>
+          <p:cNvPr id="4" name="Footer Placeholder 3"/>
+          <p:cNvSpPr>
+            <a:spLocks noGrp="1"/>
+          </p:cNvSpPr>
+          <p:nvPr>
+            <p:ph type="ftr" sz="quarter" idx="11"/>
+          </p:nvPr>
+        </p:nvSpPr>
+        <p:spPr/>
+        <p:txBody>
+          <a:bodyPr/>
+          <a:lstStyle/>
+          <a:p>
+            <a:r>
+              <a:rPr lang="vi-VN" smtClean="0"/>
+              <a:t>Lưu Văn Diệp - Đề cương cao học</a:t>
+            </a:r>
+            <a:endParaRPr lang="en-US"/>
+          </a:p>
+        </p:txBody>
+      </p:sp>
+      <p:sp>
+        <p:nvSpPr>
+          <p:cNvPr id="5" name="Slide Number Placeholder 4"/>
+          <p:cNvSpPr>
+            <a:spLocks noGrp="1"/>
+          </p:cNvSpPr>
+          <p:nvPr>
+            <p:ph type="sldNum" sz="quarter" idx="12"/>
+          </p:nvPr>
+        </p:nvSpPr>
+        <p:spPr/>
+        <p:txBody>
+          <a:bodyPr/>
+          <a:lstStyle/>
+          <a:p>
+            <a:fld id="{B6F15528-21DE-4FAA-801E-634DDDAF4B2B}" type="slidenum">
+              <a:rPr lang="en-US" smtClean="0"/>
+              <a:pPr/>
+              <a:t>14</a:t>
+            </a:fld>
+            <a:endParaRPr lang="en-US"/>
+          </a:p>
+        </p:txBody>
+      </p:sp>
+    </p:spTree>
+    <p:extLst>
+      <p:ext uri="{BB962C8B-B14F-4D97-AF65-F5344CB8AC3E}">
+        <p14:creationId xmlns:p14="http://schemas.microsoft.com/office/powerpoint/2010/main" val="974859581"/>
+      </p:ext>
+    </p:extLst>
+  </p:cSld>
+  <p:clrMapOvr>
+    <a:masterClrMapping/>
+  </p:clrMapOvr>
+  <p:timing>
+    <p:tnLst>
+      <p:par>
+        <p:cTn id="1" dur="indefinite" restart="never" nodeType="tmRoot"/>
+      </p:par>
+    </p:tnLst>
+  </p:timing>
+</p:sld>
+</file>
+
+<file path=ppt/slides/slide15.xml><?xml version="1.0" encoding="utf-8"?>
+<p:sld xmlns:a="http://schemas.openxmlformats.org/drawingml/2006/main" xmlns:r="http://schemas.openxmlformats.org/officeDocument/2006/relationships" xmlns:p="http://schemas.openxmlformats.org/presentationml/2006/main">
+  <p:cSld>
+    <p:spTree>
+      <p:nvGrpSpPr>
+        <p:cNvPr id="1" name=""/>
+        <p:cNvGrpSpPr/>
+        <p:nvPr/>
+      </p:nvGrpSpPr>
+      <p:grpSpPr>
+        <a:xfrm>
+          <a:off x="0" y="0"/>
+          <a:ext cx="0" cy="0"/>
+          <a:chOff x="0" y="0"/>
+          <a:chExt cx="0" cy="0"/>
+        </a:xfrm>
+      </p:grpSpPr>
+      <p:sp>
+        <p:nvSpPr>
+          <p:cNvPr id="2" name="Title 1"/>
+          <p:cNvSpPr>
+            <a:spLocks noGrp="1"/>
+          </p:cNvSpPr>
+          <p:nvPr>
+            <p:ph type="title"/>
+          </p:nvPr>
+        </p:nvSpPr>
+        <p:spPr/>
+        <p:txBody>
+          <a:bodyPr/>
+          <a:lstStyle/>
+          <a:p>
+            <a:r>
               <a:rPr lang="en-US" smtClean="0"/>
               <a:t>3. Phương pháp nghiên cứu</a:t>
             </a:r>
@@ -5155,7 +5450,6 @@
               <a:rPr lang="en-US" smtClean="0"/>
               <a:t>Phương pháp trọng số</a:t>
             </a:r>
-            <a:endParaRPr lang="en-US" smtClean="0"/>
           </a:p>
           <a:p>
             <a:pPr lvl="1"/>
@@ -5268,7 +5562,7 @@
             <a:fld id="{B6F15528-21DE-4FAA-801E-634DDDAF4B2B}" type="slidenum">
               <a:rPr lang="en-US" smtClean="0"/>
               <a:pPr/>
-              <a:t>13</a:t>
+              <a:t>15</a:t>
             </a:fld>
             <a:endParaRPr lang="en-US"/>
           </a:p>
@@ -5294,139 +5588,7 @@
 </p:sld>
 </file>
 
-<file path=ppt/slides/slide14.xml><?xml version="1.0" encoding="utf-8"?>
-<p:sld xmlns:a="http://schemas.openxmlformats.org/drawingml/2006/main" xmlns:r="http://schemas.openxmlformats.org/officeDocument/2006/relationships" xmlns:p="http://schemas.openxmlformats.org/presentationml/2006/main">
-  <p:cSld>
-    <p:spTree>
-      <p:nvGrpSpPr>
-        <p:cNvPr id="1" name=""/>
-        <p:cNvGrpSpPr/>
-        <p:nvPr/>
-      </p:nvGrpSpPr>
-      <p:grpSpPr>
-        <a:xfrm>
-          <a:off x="0" y="0"/>
-          <a:ext cx="0" cy="0"/>
-          <a:chOff x="0" y="0"/>
-          <a:chExt cx="0" cy="0"/>
-        </a:xfrm>
-      </p:grpSpPr>
-      <p:sp>
-        <p:nvSpPr>
-          <p:cNvPr id="2" name="Title 1"/>
-          <p:cNvSpPr>
-            <a:spLocks noGrp="1"/>
-          </p:cNvSpPr>
-          <p:nvPr>
-            <p:ph type="title"/>
-          </p:nvPr>
-        </p:nvSpPr>
-        <p:spPr/>
-        <p:txBody>
-          <a:bodyPr/>
-          <a:lstStyle/>
-          <a:p>
-            <a:r>
-              <a:rPr lang="en-US" smtClean="0"/>
-              <a:t>3. Phương pháp nghiên cứu</a:t>
-            </a:r>
-            <a:endParaRPr lang="en-US"/>
-          </a:p>
-        </p:txBody>
-      </p:sp>
-      <p:sp>
-        <p:nvSpPr>
-          <p:cNvPr id="3" name="Content Placeholder 2"/>
-          <p:cNvSpPr>
-            <a:spLocks noGrp="1"/>
-          </p:cNvSpPr>
-          <p:nvPr>
-            <p:ph idx="1"/>
-          </p:nvPr>
-        </p:nvSpPr>
-        <p:spPr/>
-        <p:txBody>
-          <a:bodyPr>
-            <a:normAutofit/>
-          </a:bodyPr>
-          <a:lstStyle/>
-          <a:p>
-            <a:r>
-              <a:rPr lang="en-US" smtClean="0"/>
-              <a:t>Multi-track map matching algorithm</a:t>
-            </a:r>
-            <a:endParaRPr lang="en-US"/>
-          </a:p>
-        </p:txBody>
-      </p:sp>
-      <p:sp>
-        <p:nvSpPr>
-          <p:cNvPr id="6" name="Footer Placeholder 5"/>
-          <p:cNvSpPr>
-            <a:spLocks noGrp="1"/>
-          </p:cNvSpPr>
-          <p:nvPr>
-            <p:ph type="ftr" sz="quarter" idx="11"/>
-          </p:nvPr>
-        </p:nvSpPr>
-        <p:spPr/>
-        <p:txBody>
-          <a:bodyPr/>
-          <a:lstStyle/>
-          <a:p>
-            <a:r>
-              <a:rPr lang="vi-VN" smtClean="0"/>
-              <a:t>Lưu Văn Diệp - Đề cương cao học</a:t>
-            </a:r>
-            <a:endParaRPr lang="en-US"/>
-          </a:p>
-        </p:txBody>
-      </p:sp>
-      <p:sp>
-        <p:nvSpPr>
-          <p:cNvPr id="7" name="Slide Number Placeholder 6"/>
-          <p:cNvSpPr>
-            <a:spLocks noGrp="1"/>
-          </p:cNvSpPr>
-          <p:nvPr>
-            <p:ph type="sldNum" sz="quarter" idx="12"/>
-          </p:nvPr>
-        </p:nvSpPr>
-        <p:spPr/>
-        <p:txBody>
-          <a:bodyPr/>
-          <a:lstStyle/>
-          <a:p>
-            <a:fld id="{B6F15528-21DE-4FAA-801E-634DDDAF4B2B}" type="slidenum">
-              <a:rPr lang="en-US" smtClean="0"/>
-              <a:pPr/>
-              <a:t>14</a:t>
-            </a:fld>
-            <a:endParaRPr lang="en-US"/>
-          </a:p>
-        </p:txBody>
-      </p:sp>
-    </p:spTree>
-    <p:extLst>
-      <p:ext uri="{BB962C8B-B14F-4D97-AF65-F5344CB8AC3E}">
-        <p14:creationId xmlns:p14="http://schemas.microsoft.com/office/powerpoint/2010/main" val="2303885260"/>
-      </p:ext>
-    </p:extLst>
-  </p:cSld>
-  <p:clrMapOvr>
-    <a:masterClrMapping/>
-  </p:clrMapOvr>
-  <p:timing>
-    <p:tnLst>
-      <p:par>
-        <p:cTn id="1" dur="indefinite" restart="never" nodeType="tmRoot"/>
-      </p:par>
-    </p:tnLst>
-  </p:timing>
-</p:sld>
-</file>
-
-<file path=ppt/slides/slide15.xml><?xml version="1.0" encoding="utf-8"?>
+<file path=ppt/slides/slide16.xml><?xml version="1.0" encoding="utf-8"?>
 <p:sld xmlns:a="http://schemas.openxmlformats.org/drawingml/2006/main" xmlns:r="http://schemas.openxmlformats.org/officeDocument/2006/relationships" xmlns:p="http://schemas.openxmlformats.org/presentationml/2006/main">
   <p:cSld>
     <p:spTree>
@@ -5619,7 +5781,7 @@
             <a:fld id="{B6F15528-21DE-4FAA-801E-634DDDAF4B2B}" type="slidenum">
               <a:rPr lang="en-US" smtClean="0"/>
               <a:pPr/>
-              <a:t>15</a:t>
+              <a:t>16</a:t>
             </a:fld>
             <a:endParaRPr lang="en-US"/>
           </a:p>
@@ -5645,7 +5807,7 @@
 </p:sld>
 </file>
 
-<file path=ppt/slides/slide16.xml><?xml version="1.0" encoding="utf-8"?>
+<file path=ppt/slides/slide17.xml><?xml version="1.0" encoding="utf-8"?>
 <p:sld xmlns:a="http://schemas.openxmlformats.org/drawingml/2006/main" xmlns:r="http://schemas.openxmlformats.org/officeDocument/2006/relationships" xmlns:p="http://schemas.openxmlformats.org/presentationml/2006/main">
   <p:cSld>
     <p:spTree>
@@ -5838,7 +6000,7 @@
             <a:fld id="{B6F15528-21DE-4FAA-801E-634DDDAF4B2B}" type="slidenum">
               <a:rPr lang="en-US" smtClean="0"/>
               <a:pPr/>
-              <a:t>16</a:t>
+              <a:t>17</a:t>
             </a:fld>
             <a:endParaRPr lang="en-US"/>
           </a:p>
@@ -5864,7 +6026,409 @@
 </p:sld>
 </file>
 
-<file path=ppt/slides/slide17.xml><?xml version="1.0" encoding="utf-8"?>
+<file path=ppt/slides/slide18.xml><?xml version="1.0" encoding="utf-8"?>
+<p:sld xmlns:a="http://schemas.openxmlformats.org/drawingml/2006/main" xmlns:r="http://schemas.openxmlformats.org/officeDocument/2006/relationships" xmlns:p="http://schemas.openxmlformats.org/presentationml/2006/main">
+  <p:cSld>
+    <p:bg>
+      <p:bgRef idx="1001">
+        <a:schemeClr val="bg1"/>
+      </p:bgRef>
+    </p:bg>
+    <p:spTree>
+      <p:nvGrpSpPr>
+        <p:cNvPr id="1" name=""/>
+        <p:cNvGrpSpPr/>
+        <p:nvPr/>
+      </p:nvGrpSpPr>
+      <p:grpSpPr>
+        <a:xfrm>
+          <a:off x="0" y="0"/>
+          <a:ext cx="0" cy="0"/>
+          <a:chOff x="0" y="0"/>
+          <a:chExt cx="0" cy="0"/>
+        </a:xfrm>
+      </p:grpSpPr>
+      <p:sp>
+        <p:nvSpPr>
+          <p:cNvPr id="2" name="Title 1"/>
+          <p:cNvSpPr>
+            <a:spLocks noGrp="1"/>
+          </p:cNvSpPr>
+          <p:nvPr>
+            <p:ph type="title"/>
+          </p:nvPr>
+        </p:nvSpPr>
+        <p:spPr/>
+        <p:txBody>
+          <a:bodyPr/>
+          <a:lstStyle/>
+          <a:p>
+            <a:r>
+              <a:rPr lang="en-US"/>
+              <a:t>4. Hướng nghiên cứu</a:t>
+            </a:r>
+          </a:p>
+        </p:txBody>
+      </p:sp>
+      <p:sp>
+        <p:nvSpPr>
+          <p:cNvPr id="3" name="Content Placeholder 2"/>
+          <p:cNvSpPr>
+            <a:spLocks noGrp="1"/>
+          </p:cNvSpPr>
+          <p:nvPr>
+            <p:ph idx="1"/>
+          </p:nvPr>
+        </p:nvSpPr>
+        <p:spPr>
+          <a:xfrm>
+            <a:off x="457200" y="1295400"/>
+            <a:ext cx="8229600" cy="4830763"/>
+          </a:xfrm>
+        </p:spPr>
+        <p:txBody>
+          <a:bodyPr/>
+          <a:lstStyle/>
+          <a:p>
+            <a:r>
+              <a:rPr lang="en-US" smtClean="0"/>
+              <a:t>Hướng tiếp cận multi-point (tập hợp điểm)</a:t>
+            </a:r>
+            <a:endParaRPr lang="en-US"/>
+          </a:p>
+        </p:txBody>
+      </p:sp>
+      <p:sp>
+        <p:nvSpPr>
+          <p:cNvPr id="4" name="Footer Placeholder 3"/>
+          <p:cNvSpPr>
+            <a:spLocks noGrp="1"/>
+          </p:cNvSpPr>
+          <p:nvPr>
+            <p:ph type="ftr" sz="quarter" idx="11"/>
+          </p:nvPr>
+        </p:nvSpPr>
+        <p:spPr/>
+        <p:txBody>
+          <a:bodyPr/>
+          <a:lstStyle/>
+          <a:p>
+            <a:r>
+              <a:rPr lang="vi-VN" smtClean="0"/>
+              <a:t>Lưu Văn Diệp - Đề cương cao học</a:t>
+            </a:r>
+            <a:endParaRPr lang="en-US"/>
+          </a:p>
+        </p:txBody>
+      </p:sp>
+      <p:sp>
+        <p:nvSpPr>
+          <p:cNvPr id="5" name="Slide Number Placeholder 4"/>
+          <p:cNvSpPr>
+            <a:spLocks noGrp="1"/>
+          </p:cNvSpPr>
+          <p:nvPr>
+            <p:ph type="sldNum" sz="quarter" idx="12"/>
+          </p:nvPr>
+        </p:nvSpPr>
+        <p:spPr/>
+        <p:txBody>
+          <a:bodyPr/>
+          <a:lstStyle/>
+          <a:p>
+            <a:fld id="{B6F15528-21DE-4FAA-801E-634DDDAF4B2B}" type="slidenum">
+              <a:rPr lang="en-US" smtClean="0"/>
+              <a:pPr/>
+              <a:t>18</a:t>
+            </a:fld>
+            <a:endParaRPr lang="en-US"/>
+          </a:p>
+        </p:txBody>
+      </p:sp>
+      <p:grpSp>
+        <p:nvGrpSpPr>
+          <p:cNvPr id="12" name="Group 11"/>
+          <p:cNvGrpSpPr/>
+          <p:nvPr/>
+        </p:nvGrpSpPr>
+        <p:grpSpPr>
+          <a:xfrm>
+            <a:off x="1225769" y="2133600"/>
+            <a:ext cx="6627813" cy="3362325"/>
+            <a:chOff x="1225769" y="2133600"/>
+            <a:chExt cx="6627813" cy="3362325"/>
+          </a:xfrm>
+        </p:grpSpPr>
+        <p:pic>
+          <p:nvPicPr>
+            <p:cNvPr id="1026" name="Picture 2"/>
+            <p:cNvPicPr>
+              <a:picLocks noChangeAspect="1" noChangeArrowheads="1"/>
+            </p:cNvPicPr>
+            <p:nvPr/>
+          </p:nvPicPr>
+          <p:blipFill>
+            <a:blip r:embed="rId3">
+              <a:extLst>
+                <a:ext uri="{28A0092B-C50C-407E-A947-70E740481C1C}">
+                  <a14:useLocalDpi xmlns:a14="http://schemas.microsoft.com/office/drawing/2010/main" val="0"/>
+                </a:ext>
+              </a:extLst>
+            </a:blip>
+            <a:srcRect/>
+            <a:stretch>
+              <a:fillRect/>
+            </a:stretch>
+          </p:blipFill>
+          <p:spPr bwMode="auto">
+            <a:xfrm>
+              <a:off x="1225769" y="2133600"/>
+              <a:ext cx="6627813" cy="3362325"/>
+            </a:xfrm>
+            <a:prstGeom prst="rect">
+              <a:avLst/>
+            </a:prstGeom>
+            <a:solidFill>
+              <a:srgbClr val="FFFFFF">
+                <a:shade val="85000"/>
+              </a:srgbClr>
+            </a:solidFill>
+            <a:ln w="88900" cap="sq">
+              <a:solidFill>
+                <a:srgbClr val="FFFFFF"/>
+              </a:solidFill>
+              <a:miter lim="800000"/>
+            </a:ln>
+            <a:effectLst>
+              <a:outerShdw blurRad="55000" dist="18000" dir="5400000" algn="tl" rotWithShape="0">
+                <a:srgbClr val="000000">
+                  <a:alpha val="40000"/>
+                </a:srgbClr>
+              </a:outerShdw>
+            </a:effectLst>
+            <a:scene3d>
+              <a:camera prst="orthographicFront"/>
+              <a:lightRig rig="twoPt" dir="t">
+                <a:rot lat="0" lon="0" rev="7200000"/>
+              </a:lightRig>
+            </a:scene3d>
+            <a:sp3d>
+              <a:bevelT w="25400" h="19050"/>
+              <a:contourClr>
+                <a:srgbClr val="FFFFFF"/>
+              </a:contourClr>
+            </a:sp3d>
+            <a:extLst>
+              <a:ext uri="{909E8E84-426E-40DD-AFC4-6F175D3DCCD1}">
+                <a14:hiddenFill xmlns:a14="http://schemas.microsoft.com/office/drawing/2010/main">
+                  <a:solidFill>
+                    <a:schemeClr val="accent1"/>
+                  </a:solidFill>
+                </a14:hiddenFill>
+              </a:ext>
+              <a:ext uri="{91240B29-F687-4F45-9708-019B960494DF}">
+                <a14:hiddenLine xmlns:a14="http://schemas.microsoft.com/office/drawing/2010/main" w="9525">
+                  <a:solidFill>
+                    <a:schemeClr val="tx1"/>
+                  </a:solidFill>
+                  <a:miter lim="800000"/>
+                  <a:headEnd/>
+                  <a:tailEnd/>
+                </a14:hiddenLine>
+              </a:ext>
+              <a:ext uri="{AF507438-7753-43E0-B8FC-AC1667EBCBE1}">
+                <a14:hiddenEffects xmlns:a14="http://schemas.microsoft.com/office/drawing/2010/main">
+                  <a:effectLst>
+                    <a:outerShdw dist="35921" dir="2700000" algn="ctr" rotWithShape="0">
+                      <a:schemeClr val="bg2"/>
+                    </a:outerShdw>
+                  </a:effectLst>
+                </a14:hiddenEffects>
+              </a:ext>
+            </a:extLst>
+          </p:spPr>
+        </p:pic>
+        <p:sp>
+          <p:nvSpPr>
+            <p:cNvPr id="7" name="Rectangle 6"/>
+            <p:cNvSpPr/>
+            <p:nvPr/>
+          </p:nvSpPr>
+          <p:spPr>
+            <a:xfrm rot="382276">
+              <a:off x="1897272" y="3583389"/>
+              <a:ext cx="4348303" cy="292907"/>
+            </a:xfrm>
+            <a:prstGeom prst="rect">
+              <a:avLst/>
+            </a:prstGeom>
+            <a:noFill/>
+          </p:spPr>
+          <p:style>
+            <a:lnRef idx="2">
+              <a:schemeClr val="accent1">
+                <a:shade val="50000"/>
+              </a:schemeClr>
+            </a:lnRef>
+            <a:fillRef idx="1">
+              <a:schemeClr val="accent1"/>
+            </a:fillRef>
+            <a:effectRef idx="0">
+              <a:schemeClr val="accent1"/>
+            </a:effectRef>
+            <a:fontRef idx="minor">
+              <a:schemeClr val="lt1"/>
+            </a:fontRef>
+          </p:style>
+          <p:txBody>
+            <a:bodyPr rtlCol="0" anchor="ctr"/>
+            <a:lstStyle/>
+            <a:p>
+              <a:pPr algn="ctr"/>
+              <a:endParaRPr lang="en-US"/>
+            </a:p>
+          </p:txBody>
+        </p:sp>
+        <p:sp>
+          <p:nvSpPr>
+            <p:cNvPr id="8" name="Rectangle 7"/>
+            <p:cNvSpPr/>
+            <p:nvPr/>
+          </p:nvSpPr>
+          <p:spPr>
+            <a:xfrm>
+              <a:off x="6324600" y="3839687"/>
+              <a:ext cx="1295400" cy="287393"/>
+            </a:xfrm>
+            <a:prstGeom prst="rect">
+              <a:avLst/>
+            </a:prstGeom>
+            <a:noFill/>
+          </p:spPr>
+          <p:style>
+            <a:lnRef idx="2">
+              <a:schemeClr val="accent1">
+                <a:shade val="50000"/>
+              </a:schemeClr>
+            </a:lnRef>
+            <a:fillRef idx="1">
+              <a:schemeClr val="accent1"/>
+            </a:fillRef>
+            <a:effectRef idx="0">
+              <a:schemeClr val="accent1"/>
+            </a:effectRef>
+            <a:fontRef idx="minor">
+              <a:schemeClr val="lt1"/>
+            </a:fontRef>
+          </p:style>
+          <p:txBody>
+            <a:bodyPr rtlCol="0" anchor="ctr"/>
+            <a:lstStyle/>
+            <a:p>
+              <a:pPr algn="ctr"/>
+              <a:endParaRPr lang="en-US"/>
+            </a:p>
+          </p:txBody>
+        </p:sp>
+        <p:sp>
+          <p:nvSpPr>
+            <p:cNvPr id="9" name="Rectangle 8"/>
+            <p:cNvSpPr/>
+            <p:nvPr/>
+          </p:nvSpPr>
+          <p:spPr>
+            <a:xfrm rot="1120042">
+              <a:off x="5670640" y="3783835"/>
+              <a:ext cx="1143000" cy="386817"/>
+            </a:xfrm>
+            <a:prstGeom prst="rect">
+              <a:avLst/>
+            </a:prstGeom>
+            <a:noFill/>
+            <a:ln>
+              <a:solidFill>
+                <a:srgbClr val="FF0000"/>
+              </a:solidFill>
+            </a:ln>
+          </p:spPr>
+          <p:style>
+            <a:lnRef idx="2">
+              <a:schemeClr val="accent3">
+                <a:shade val="50000"/>
+              </a:schemeClr>
+            </a:lnRef>
+            <a:fillRef idx="1">
+              <a:schemeClr val="accent3"/>
+            </a:fillRef>
+            <a:effectRef idx="0">
+              <a:schemeClr val="accent3"/>
+            </a:effectRef>
+            <a:fontRef idx="minor">
+              <a:schemeClr val="lt1"/>
+            </a:fontRef>
+          </p:style>
+          <p:txBody>
+            <a:bodyPr rtlCol="0" anchor="ctr"/>
+            <a:lstStyle/>
+            <a:p>
+              <a:pPr algn="ctr"/>
+              <a:endParaRPr lang="en-US"/>
+            </a:p>
+          </p:txBody>
+        </p:sp>
+      </p:grpSp>
+      <p:sp>
+        <p:nvSpPr>
+          <p:cNvPr id="13" name="TextBox 12"/>
+          <p:cNvSpPr txBox="1"/>
+          <p:nvPr/>
+        </p:nvSpPr>
+        <p:spPr>
+          <a:xfrm>
+            <a:off x="1138018" y="5715000"/>
+            <a:ext cx="6786782" cy="646331"/>
+          </a:xfrm>
+          <a:prstGeom prst="rect">
+            <a:avLst/>
+          </a:prstGeom>
+          <a:noFill/>
+        </p:spPr>
+        <p:txBody>
+          <a:bodyPr wrap="square" rtlCol="0">
+            <a:spAutoFit/>
+          </a:bodyPr>
+          <a:lstStyle/>
+          <a:p>
+            <a:pPr algn="ctr"/>
+            <a:r>
+              <a:rPr lang="en-US" smtClean="0"/>
+              <a:t>Dấu X đại diện cho vị trí GPS lấy được từ thiết bị. Các hình chữ nhật bao lấy các điểm GPS cùng thuộc về một segment nào đó.</a:t>
+            </a:r>
+            <a:endParaRPr lang="en-US"/>
+          </a:p>
+        </p:txBody>
+      </p:sp>
+    </p:spTree>
+    <p:extLst>
+      <p:ext uri="{BB962C8B-B14F-4D97-AF65-F5344CB8AC3E}">
+        <p14:creationId xmlns:p14="http://schemas.microsoft.com/office/powerpoint/2010/main" val="2224563656"/>
+      </p:ext>
+    </p:extLst>
+  </p:cSld>
+  <p:clrMapOvr>
+    <a:overrideClrMapping bg1="lt1" tx1="dk1" bg2="lt2" tx2="dk2" accent1="accent1" accent2="accent2" accent3="accent3" accent4="accent4" accent5="accent5" accent6="accent6" hlink="hlink" folHlink="folHlink"/>
+  </p:clrMapOvr>
+  <p:timing>
+    <p:tnLst>
+      <p:par>
+        <p:cTn id="1" dur="indefinite" restart="never" nodeType="tmRoot"/>
+      </p:par>
+    </p:tnLst>
+  </p:timing>
+</p:sld>
+</file>
+
+<file path=ppt/slides/slide19.xml><?xml version="1.0" encoding="utf-8"?>
 <p:sld xmlns:a="http://schemas.openxmlformats.org/drawingml/2006/main" xmlns:r="http://schemas.openxmlformats.org/officeDocument/2006/relationships" xmlns:p="http://schemas.openxmlformats.org/presentationml/2006/main">
   <p:cSld>
     <p:spTree>
@@ -5969,7 +6533,7 @@
             <a:fld id="{B6F15528-21DE-4FAA-801E-634DDDAF4B2B}" type="slidenum">
               <a:rPr lang="en-US" smtClean="0"/>
               <a:pPr/>
-              <a:t>17</a:t>
+              <a:t>19</a:t>
             </a:fld>
             <a:endParaRPr lang="en-US"/>
           </a:p>
@@ -6366,14 +6930,42 @@
             </a:pPr>
             <a:r>
               <a:rPr lang="en-US" smtClean="0"/>
-              <a:t>Vấn đề tiền xử lý dữ liệu:</a:t>
-            </a:r>
-          </a:p>
-          <a:p>
-            <a:r>
-              <a:rPr lang="en-US" smtClean="0"/>
-              <a:t>Xác định vị trí của phương tiện</a:t>
-            </a:r>
+              <a:t>Vấn đề tiền xử lý dữ liệu</a:t>
+            </a:r>
+            <a:r>
+              <a:rPr lang="en-US" smtClean="0"/>
+              <a:t>:</a:t>
+            </a:r>
+            <a:endParaRPr lang="en-US" smtClean="0"/>
+          </a:p>
+          <a:p>
+            <a:r>
+              <a:rPr lang="en-US"/>
+              <a:t>Xử </a:t>
+            </a:r>
+            <a:r>
+              <a:rPr lang="en-US"/>
+              <a:t>lý </a:t>
+            </a:r>
+            <a:r>
+              <a:rPr lang="en-US" smtClean="0"/>
+              <a:t>nhiễu GPS</a:t>
+            </a:r>
+          </a:p>
+          <a:p>
+            <a:r>
+              <a:rPr lang="en-US"/>
+              <a:t>Xác định vị trí của </a:t>
+            </a:r>
+            <a:r>
+              <a:rPr lang="en-US"/>
+              <a:t>phương </a:t>
+            </a:r>
+            <a:r>
+              <a:rPr lang="en-US" smtClean="0"/>
+              <a:t>tiện</a:t>
+            </a:r>
+            <a:endParaRPr lang="en-US" smtClean="0"/>
           </a:p>
           <a:p>
             <a:r>
@@ -6659,7 +7251,7 @@
             <p:spPr/>
             <p:txBody>
               <a:bodyPr>
-                <a:normAutofit/>
+                <a:normAutofit fontScale="92500" lnSpcReduction="20000"/>
               </a:bodyPr>
               <a:lstStyle/>
               <a:p>
@@ -6669,7 +7261,11 @@
                 </a:r>
               </a:p>
               <a:p>
-                <a:pPr lvl="1"/>
+                <a:pPr lvl="1">
+                  <a:lnSpc>
+                    <a:spcPct val="150000"/>
+                  </a:lnSpc>
+                </a:pPr>
                 <a:r>
                   <a:rPr lang="en-US"/>
                   <a:t>Quỹ </a:t>
@@ -6681,28 +7277,38 @@
                 <a14:m>
                   <m:oMath xmlns:m="http://schemas.openxmlformats.org/officeDocument/2006/math">
                     <m:r>
-                      <a:rPr lang="en-US" i="1"/>
+                      <a:rPr lang="en-US" i="1">
+                        <a:latin typeface="Cambria Math"/>
+                      </a:rPr>
                       <m:t>𝑇</m:t>
                     </m:r>
                     <m:r>
-                      <a:rPr lang="en-US" i="1"/>
+                      <a:rPr lang="en-US" i="1">
+                        <a:latin typeface="Cambria Math"/>
+                      </a:rPr>
                       <m:t>=(</m:t>
                     </m:r>
                     <m:sSub>
                       <m:sSubPr>
                         <m:ctrlPr>
-                          <a:rPr lang="en-US" i="1"/>
+                          <a:rPr lang="en-US" i="1">
+                            <a:latin typeface="Cambria Math"/>
+                          </a:rPr>
                         </m:ctrlPr>
                       </m:sSubPr>
                       <m:e>
                         <m:r>
-                          <a:rPr lang="en-US" i="1"/>
+                          <a:rPr lang="en-US" i="1">
+                            <a:latin typeface="Cambria Math"/>
+                          </a:rPr>
                           <m:t>𝑡</m:t>
                         </m:r>
                       </m:e>
                       <m:sub>
                         <m:r>
-                          <a:rPr lang="en-US" i="1"/>
+                          <a:rPr lang="en-US" i="1">
+                            <a:latin typeface="Cambria Math"/>
+                          </a:rPr>
                           <m:t>𝑛</m:t>
                         </m:r>
                       </m:sub>
@@ -6712,24 +7318,34 @@
                         <m:begChr m:val="|"/>
                         <m:endChr m:val=""/>
                         <m:ctrlPr>
-                          <a:rPr lang="en-US" i="1"/>
+                          <a:rPr lang="en-US" i="1">
+                            <a:latin typeface="Cambria Math"/>
+                          </a:rPr>
                         </m:ctrlPr>
                       </m:dPr>
                       <m:e>
                         <m:r>
-                          <a:rPr lang="en-US" i="1"/>
+                          <a:rPr lang="en-US" i="1">
+                            <a:latin typeface="Cambria Math"/>
+                          </a:rPr>
                           <m:t>𝑛</m:t>
                         </m:r>
                         <m:r>
-                          <a:rPr lang="en-US" i="1"/>
+                          <a:rPr lang="en-US" i="1">
+                            <a:latin typeface="Cambria Math"/>
+                          </a:rPr>
                           <m:t>=1,…,</m:t>
                         </m:r>
                         <m:r>
-                          <a:rPr lang="en-US" i="1"/>
+                          <a:rPr lang="en-US" i="1">
+                            <a:latin typeface="Cambria Math"/>
+                          </a:rPr>
                           <m:t>𝑁</m:t>
                         </m:r>
                         <m:r>
-                          <a:rPr lang="en-US" i="1"/>
+                          <a:rPr lang="en-US" i="1">
+                            <a:latin typeface="Cambria Math"/>
+                          </a:rPr>
                           <m:t>)</m:t>
                         </m:r>
                       </m:e>
@@ -6740,86 +7356,116 @@
               </a:p>
               <a:p>
                 <a:pPr marL="457200" lvl="1" indent="0">
+                  <a:lnSpc>
+                    <a:spcPct val="150000"/>
+                  </a:lnSpc>
                   <a:buNone/>
                 </a:pPr>
                 <a:r>
-                  <a:rPr lang="en-US" smtClean="0"/>
-                  <a:t>Kinh độ(t</a:t>
+                  <a:rPr lang="en-US" sz="2400" smtClean="0"/>
+                  <a:t>t</a:t>
                 </a:r>
                 <a:r>
-                  <a:rPr lang="en-US" baseline="-25000" smtClean="0"/>
+                  <a:rPr lang="en-US" sz="2400" baseline="-25000" smtClean="0"/>
                   <a:t>n</a:t>
                 </a:r>
                 <a:r>
-                  <a:rPr lang="en-US" smtClean="0"/>
+                  <a:rPr lang="en-US" sz="2400" smtClean="0"/>
+                  <a:t>: vị trí GPS thu được từ thiết bị</a:t>
+                </a:r>
+              </a:p>
+              <a:p>
+                <a:pPr marL="457200" lvl="1" indent="0">
+                  <a:lnSpc>
+                    <a:spcPct val="150000"/>
+                  </a:lnSpc>
+                  <a:buNone/>
+                </a:pPr>
+                <a:r>
+                  <a:rPr lang="en-US" sz="2400" smtClean="0"/>
+                  <a:t>Kinh </a:t>
+                </a:r>
+                <a:r>
+                  <a:rPr lang="en-US" sz="2400" smtClean="0"/>
+                  <a:t>độ(t</a:t>
+                </a:r>
+                <a:r>
+                  <a:rPr lang="en-US" sz="2400" baseline="-25000" smtClean="0"/>
+                  <a:t>n</a:t>
+                </a:r>
+                <a:r>
+                  <a:rPr lang="en-US" sz="2400" smtClean="0"/>
                   <a:t>.lon</a:t>
                 </a:r>
                 <a:r>
-                  <a:rPr lang="en-US"/>
+                  <a:rPr lang="en-US" sz="2400"/>
                   <a:t>), vĩ độ (t</a:t>
                 </a:r>
                 <a:r>
-                  <a:rPr lang="en-US" baseline="-25000"/>
+                  <a:rPr lang="en-US" sz="2400" baseline="-25000"/>
                   <a:t>n</a:t>
                 </a:r>
                 <a:r>
-                  <a:rPr lang="en-US"/>
-                  <a:t>.lat</a:t>
+                  <a:rPr lang="en-US" sz="2400"/>
+                  <a:t>.lat), </a:t>
                 </a:r>
                 <a:r>
-                  <a:rPr lang="en-US"/>
-                  <a:t>), </a:t>
-                </a:r>
-                <a:r>
-                  <a:rPr lang="en-US" smtClean="0"/>
+                  <a:rPr lang="en-US" sz="2400" smtClean="0"/>
                   <a:t>vận tốc </a:t>
                 </a:r>
                 <a:r>
-                  <a:rPr lang="en-US"/>
+                  <a:rPr lang="en-US" sz="2400"/>
                   <a:t>(</a:t>
                 </a:r>
                 <a:r>
-                  <a:rPr lang="en-US" smtClean="0"/>
+                  <a:rPr lang="en-US" sz="2400" smtClean="0"/>
                   <a:t>t</a:t>
                 </a:r>
                 <a:r>
-                  <a:rPr lang="en-US" baseline="-25000" smtClean="0"/>
+                  <a:rPr lang="en-US" sz="2400" baseline="-25000" smtClean="0"/>
                   <a:t>n</a:t>
                 </a:r>
                 <a:r>
-                  <a:rPr lang="en-US" smtClean="0"/>
+                  <a:rPr lang="en-US" sz="2400" smtClean="0"/>
                   <a:t>.v), </a:t>
                 </a:r>
                 <a:r>
-                  <a:rPr lang="en-US"/>
-                  <a:t>thời gian </a:t>
+                  <a:rPr lang="en-US" sz="2400"/>
+                  <a:t>thời gian (</a:t>
                 </a:r>
                 <a:r>
-                  <a:rPr lang="en-US"/>
-                  <a:t>(</a:t>
-                </a:r>
-                <a:r>
-                  <a:rPr lang="en-US" smtClean="0"/>
+                  <a:rPr lang="en-US" sz="2400" smtClean="0"/>
                   <a:t>t</a:t>
                 </a:r>
                 <a:r>
-                  <a:rPr lang="en-US" baseline="-25000" smtClean="0"/>
+                  <a:rPr lang="en-US" sz="2400" baseline="-25000" smtClean="0"/>
                   <a:t>n</a:t>
                 </a:r>
                 <a:r>
-                  <a:rPr lang="en-US" smtClean="0"/>
+                  <a:rPr lang="en-US" sz="2400" smtClean="0"/>
                   <a:t>.time)</a:t>
                 </a:r>
               </a:p>
               <a:p>
-                <a:pPr lvl="1"/>
+                <a:pPr lvl="1">
+                  <a:lnSpc>
+                    <a:spcPct val="150000"/>
+                  </a:lnSpc>
+                </a:pPr>
                 <a:r>
                   <a:rPr lang="en-US" smtClean="0"/>
-                  <a:t>Đoạn đường (segment)</a:t>
+                  <a:t>Đoạn </a:t>
+                </a:r>
+                <a:r>
+                  <a:rPr lang="en-US" smtClean="0"/>
+                  <a:t>đường (segment)</a:t>
                 </a:r>
               </a:p>
               <a:p>
                 <a:pPr marL="457200" lvl="1" indent="0">
+                  <a:lnSpc>
+                    <a:spcPct val="150000"/>
+                  </a:lnSpc>
                   <a:buNone/>
                 </a:pPr>
                 <a14:m>
@@ -6908,7 +7554,11 @@
                 <a:endParaRPr lang="en-US" smtClean="0"/>
               </a:p>
               <a:p>
-                <a:pPr lvl="1"/>
+                <a:pPr lvl="1">
+                  <a:lnSpc>
+                    <a:spcPct val="150000"/>
+                  </a:lnSpc>
+                </a:pPr>
                 <a:r>
                   <a:rPr lang="en-US"/>
                   <a:t>Bản đồ số</a:t>
@@ -6917,6 +7567,9 @@
               </a:p>
               <a:p>
                 <a:pPr marL="457200" lvl="1" indent="0">
+                  <a:lnSpc>
+                    <a:spcPct val="150000"/>
+                  </a:lnSpc>
                   <a:buNone/>
                 </a:pPr>
                 <a14:m>
@@ -6926,28 +7579,38 @@
                     </m:oMathParaPr>
                     <m:oMath xmlns:m="http://schemas.openxmlformats.org/officeDocument/2006/math">
                       <m:r>
-                        <a:rPr lang="en-US" i="1"/>
+                        <a:rPr lang="en-US" i="1">
+                          <a:latin typeface="Cambria Math"/>
+                        </a:rPr>
                         <m:t>𝐺</m:t>
                       </m:r>
                       <m:r>
-                        <a:rPr lang="en-US" i="1"/>
+                        <a:rPr lang="en-US" i="1">
+                          <a:latin typeface="Cambria Math"/>
+                        </a:rPr>
                         <m:t>={</m:t>
                       </m:r>
                       <m:sSub>
                         <m:sSubPr>
                           <m:ctrlPr>
-                            <a:rPr lang="en-US" i="1"/>
+                            <a:rPr lang="en-US" i="1">
+                              <a:latin typeface="Cambria Math"/>
+                            </a:rPr>
                           </m:ctrlPr>
                         </m:sSubPr>
                         <m:e>
                           <m:r>
-                            <a:rPr lang="en-US" i="1"/>
+                            <a:rPr lang="en-US" i="1">
+                              <a:latin typeface="Cambria Math"/>
+                            </a:rPr>
                             <m:t>𝑟</m:t>
                           </m:r>
                         </m:e>
                         <m:sub>
                           <m:r>
-                            <a:rPr lang="en-US" i="1"/>
+                            <a:rPr lang="en-US" i="1">
+                              <a:latin typeface="Cambria Math"/>
+                            </a:rPr>
                             <m:t>𝑘</m:t>
                           </m:r>
                         </m:sub>
@@ -6957,24 +7620,34 @@
                           <m:begChr m:val="|"/>
                           <m:endChr m:val=""/>
                           <m:ctrlPr>
-                            <a:rPr lang="en-US" i="1"/>
+                            <a:rPr lang="en-US" i="1">
+                              <a:latin typeface="Cambria Math"/>
+                            </a:rPr>
                           </m:ctrlPr>
                         </m:dPr>
                         <m:e>
                           <m:r>
-                            <a:rPr lang="en-US" i="1"/>
+                            <a:rPr lang="en-US" i="1">
+                              <a:latin typeface="Cambria Math"/>
+                            </a:rPr>
                             <m:t>𝑘</m:t>
                           </m:r>
                           <m:r>
-                            <a:rPr lang="en-US" i="1"/>
+                            <a:rPr lang="en-US" i="1">
+                              <a:latin typeface="Cambria Math"/>
+                            </a:rPr>
                             <m:t>=1,…,</m:t>
                           </m:r>
                           <m:r>
-                            <a:rPr lang="en-US" i="1"/>
+                            <a:rPr lang="en-US" i="1">
+                              <a:latin typeface="Cambria Math"/>
+                            </a:rPr>
                             <m:t>𝐾</m:t>
                           </m:r>
                           <m:r>
-                            <a:rPr lang="en-US" i="1"/>
+                            <a:rPr lang="en-US" i="1">
+                              <a:latin typeface="Cambria Math"/>
+                            </a:rPr>
                             <m:t>}</m:t>
                           </m:r>
                         </m:e>
@@ -7002,7 +7675,7 @@
               <a:blipFill rotWithShape="1">
                 <a:blip r:embed="rId2"/>
                 <a:stretch>
-                  <a:fillRect l="-1630" t="-1752" r="-519"/>
+                  <a:fillRect l="-1481" t="-3504"/>
                 </a:stretch>
               </a:blipFill>
             </p:spPr>
@@ -7158,7 +7831,37 @@
             </a:pPr>
             <a:r>
               <a:rPr lang="en-US"/>
-              <a:t>Cho trước một quỹ đạo T, mục tiêu của map-matching là tìm </a:t>
+              <a:t>Cho trước một quỹ đạo T, mục tiêu của map-matching </a:t>
+            </a:r>
+            <a:r>
+              <a:rPr lang="en-US" smtClean="0"/>
+              <a:t>là:</a:t>
+            </a:r>
+          </a:p>
+          <a:p>
+            <a:pPr marL="0" indent="0">
+              <a:buNone/>
+            </a:pPr>
+            <a:r>
+              <a:rPr lang="en-US" smtClean="0"/>
+              <a:t>1. Với mỗi điểm t</a:t>
+            </a:r>
+            <a:r>
+              <a:rPr lang="en-US" baseline="-25000" smtClean="0"/>
+              <a:t>n</a:t>
+            </a:r>
+            <a:r>
+              <a:rPr lang="en-US" smtClean="0"/>
+              <a:t> tìm vị trí chính xác trên đoạn đường tương ứng</a:t>
+            </a:r>
+          </a:p>
+          <a:p>
+            <a:pPr marL="0" indent="0">
+              <a:buNone/>
+            </a:pPr>
+            <a:r>
+              <a:rPr lang="en-US" smtClean="0"/>
+              <a:t>2. Tìm </a:t>
             </a:r>
             <a:r>
               <a:rPr lang="en-US"/>
@@ -7166,7 +7869,19 @@
             </a:r>
             <a:r>
               <a:rPr lang="en-US" smtClean="0"/>
-              <a:t>tập các segment tương ứng </a:t>
+              <a:t>tập các </a:t>
+            </a:r>
+            <a:r>
+              <a:rPr lang="en-US" smtClean="0"/>
+              <a:t>đoạn đường</a:t>
+            </a:r>
+            <a:r>
+              <a:rPr lang="en-US" smtClean="0"/>
+              <a:t> </a:t>
+            </a:r>
+            <a:r>
+              <a:rPr lang="en-US" smtClean="0"/>
+              <a:t>tương ứng </a:t>
             </a:r>
             <a:r>
               <a:rPr lang="en-US"/>
@@ -7284,6 +7999,50 @@
       </p:sp>
       <p:sp>
         <p:nvSpPr>
+          <p:cNvPr id="3" name="Content Placeholder 2"/>
+          <p:cNvSpPr>
+            <a:spLocks noGrp="1"/>
+          </p:cNvSpPr>
+          <p:nvPr>
+            <p:ph idx="1"/>
+          </p:nvPr>
+        </p:nvSpPr>
+        <p:spPr/>
+        <p:txBody>
+          <a:bodyPr/>
+          <a:lstStyle/>
+          <a:p>
+            <a:pPr marL="0" indent="0">
+              <a:buNone/>
+            </a:pPr>
+            <a:r>
+              <a:rPr lang="en-US" smtClean="0"/>
+              <a:t>Quá trình map matching có thể chia làm hai loại:</a:t>
+            </a:r>
+          </a:p>
+          <a:p>
+            <a:pPr marL="514350" indent="-514350">
+              <a:buAutoNum type="arabicPeriod"/>
+            </a:pPr>
+            <a:r>
+              <a:rPr lang="en-US" smtClean="0"/>
+              <a:t>Toàn cục (global map matching)</a:t>
+            </a:r>
+          </a:p>
+          <a:p>
+            <a:pPr marL="514350" indent="-514350">
+              <a:buAutoNum type="arabicPeriod"/>
+            </a:pPr>
+            <a:r>
+              <a:rPr lang="en-US" smtClean="0"/>
+              <a:t>Cục bộ (local map matching)</a:t>
+            </a:r>
+            <a:endParaRPr lang="en-US"/>
+          </a:p>
+        </p:txBody>
+      </p:sp>
+      <p:sp>
+        <p:nvSpPr>
           <p:cNvPr id="4" name="Footer Placeholder 3"/>
           <p:cNvSpPr>
             <a:spLocks noGrp="1"/>
@@ -7324,6 +8083,105 @@
               <a:rPr lang="en-US" smtClean="0"/>
               <a:pPr/>
               <a:t>8</a:t>
+            </a:fld>
+            <a:endParaRPr lang="en-US"/>
+          </a:p>
+        </p:txBody>
+      </p:sp>
+    </p:spTree>
+    <p:extLst>
+      <p:ext uri="{BB962C8B-B14F-4D97-AF65-F5344CB8AC3E}">
+        <p14:creationId xmlns:p14="http://schemas.microsoft.com/office/powerpoint/2010/main" val="2764464906"/>
+      </p:ext>
+    </p:extLst>
+  </p:cSld>
+  <p:clrMapOvr>
+    <a:masterClrMapping/>
+  </p:clrMapOvr>
+</p:sld>
+</file>
+
+<file path=ppt/slides/slide9.xml><?xml version="1.0" encoding="utf-8"?>
+<p:sld xmlns:a="http://schemas.openxmlformats.org/drawingml/2006/main" xmlns:r="http://schemas.openxmlformats.org/officeDocument/2006/relationships" xmlns:p="http://schemas.openxmlformats.org/presentationml/2006/main">
+  <p:cSld>
+    <p:spTree>
+      <p:nvGrpSpPr>
+        <p:cNvPr id="1" name=""/>
+        <p:cNvGrpSpPr/>
+        <p:nvPr/>
+      </p:nvGrpSpPr>
+      <p:grpSpPr>
+        <a:xfrm>
+          <a:off x="0" y="0"/>
+          <a:ext cx="0" cy="0"/>
+          <a:chOff x="0" y="0"/>
+          <a:chExt cx="0" cy="0"/>
+        </a:xfrm>
+      </p:grpSpPr>
+      <p:sp>
+        <p:nvSpPr>
+          <p:cNvPr id="2" name="Title 1"/>
+          <p:cNvSpPr>
+            <a:spLocks noGrp="1"/>
+          </p:cNvSpPr>
+          <p:nvPr>
+            <p:ph type="title"/>
+          </p:nvPr>
+        </p:nvSpPr>
+        <p:spPr/>
+        <p:txBody>
+          <a:bodyPr/>
+          <a:lstStyle/>
+          <a:p>
+            <a:r>
+              <a:rPr lang="en-US"/>
+              <a:t>1. Giới thiệu đề tài</a:t>
+            </a:r>
+          </a:p>
+        </p:txBody>
+      </p:sp>
+      <p:sp>
+        <p:nvSpPr>
+          <p:cNvPr id="4" name="Footer Placeholder 3"/>
+          <p:cNvSpPr>
+            <a:spLocks noGrp="1"/>
+          </p:cNvSpPr>
+          <p:nvPr>
+            <p:ph type="ftr" sz="quarter" idx="11"/>
+          </p:nvPr>
+        </p:nvSpPr>
+        <p:spPr/>
+        <p:txBody>
+          <a:bodyPr/>
+          <a:lstStyle/>
+          <a:p>
+            <a:r>
+              <a:rPr lang="vi-VN" smtClean="0"/>
+              <a:t>Lưu Văn Diệp - Đề cương cao học</a:t>
+            </a:r>
+            <a:endParaRPr lang="en-US"/>
+          </a:p>
+        </p:txBody>
+      </p:sp>
+      <p:sp>
+        <p:nvSpPr>
+          <p:cNvPr id="5" name="Slide Number Placeholder 4"/>
+          <p:cNvSpPr>
+            <a:spLocks noGrp="1"/>
+          </p:cNvSpPr>
+          <p:nvPr>
+            <p:ph type="sldNum" sz="quarter" idx="12"/>
+          </p:nvPr>
+        </p:nvSpPr>
+        <p:spPr/>
+        <p:txBody>
+          <a:bodyPr/>
+          <a:lstStyle/>
+          <a:p>
+            <a:fld id="{B6F15528-21DE-4FAA-801E-634DDDAF4B2B}" type="slidenum">
+              <a:rPr lang="en-US" smtClean="0"/>
+              <a:pPr/>
+              <a:t>9</a:t>
             </a:fld>
             <a:endParaRPr lang="en-US"/>
           </a:p>
@@ -7433,161 +8291,6 @@
     <p:extLst>
       <p:ext uri="{BB962C8B-B14F-4D97-AF65-F5344CB8AC3E}">
         <p14:creationId xmlns:p14="http://schemas.microsoft.com/office/powerpoint/2010/main" val="2323843853"/>
-      </p:ext>
-    </p:extLst>
-  </p:cSld>
-  <p:clrMapOvr>
-    <a:masterClrMapping/>
-  </p:clrMapOvr>
-  <p:timing>
-    <p:tnLst>
-      <p:par>
-        <p:cTn id="1" dur="indefinite" restart="never" nodeType="tmRoot"/>
-      </p:par>
-    </p:tnLst>
-  </p:timing>
-</p:sld>
-</file>
-
-<file path=ppt/slides/slide9.xml><?xml version="1.0" encoding="utf-8"?>
-<p:sld xmlns:a="http://schemas.openxmlformats.org/drawingml/2006/main" xmlns:r="http://schemas.openxmlformats.org/officeDocument/2006/relationships" xmlns:p="http://schemas.openxmlformats.org/presentationml/2006/main">
-  <p:cSld>
-    <p:spTree>
-      <p:nvGrpSpPr>
-        <p:cNvPr id="1" name=""/>
-        <p:cNvGrpSpPr/>
-        <p:nvPr/>
-      </p:nvGrpSpPr>
-      <p:grpSpPr>
-        <a:xfrm>
-          <a:off x="0" y="0"/>
-          <a:ext cx="0" cy="0"/>
-          <a:chOff x="0" y="0"/>
-          <a:chExt cx="0" cy="0"/>
-        </a:xfrm>
-      </p:grpSpPr>
-      <p:sp>
-        <p:nvSpPr>
-          <p:cNvPr id="2" name="Title 1"/>
-          <p:cNvSpPr>
-            <a:spLocks noGrp="1"/>
-          </p:cNvSpPr>
-          <p:nvPr>
-            <p:ph type="title"/>
-          </p:nvPr>
-        </p:nvSpPr>
-        <p:spPr/>
-        <p:txBody>
-          <a:bodyPr/>
-          <a:lstStyle/>
-          <a:p>
-            <a:r>
-              <a:rPr lang="en-US" smtClean="0"/>
-              <a:t>2. Mục tiêu nghiên cứu</a:t>
-            </a:r>
-            <a:endParaRPr lang="en-US"/>
-          </a:p>
-        </p:txBody>
-      </p:sp>
-      <p:sp>
-        <p:nvSpPr>
-          <p:cNvPr id="3" name="Content Placeholder 2"/>
-          <p:cNvSpPr>
-            <a:spLocks noGrp="1"/>
-          </p:cNvSpPr>
-          <p:nvPr>
-            <p:ph idx="1"/>
-          </p:nvPr>
-        </p:nvSpPr>
-        <p:spPr/>
-        <p:txBody>
-          <a:bodyPr/>
-          <a:lstStyle/>
-          <a:p>
-            <a:pPr marL="514350" indent="-514350">
-              <a:buAutoNum type="arabicPeriod"/>
-            </a:pPr>
-            <a:r>
-              <a:rPr lang="en-US" smtClean="0"/>
-              <a:t>Xác định tuyến đường mà xe đang đi dựa vào dữ liệu GPS thu được từ điện thoại di động</a:t>
-            </a:r>
-          </a:p>
-          <a:p>
-            <a:pPr marL="514350" indent="-514350">
-              <a:buAutoNum type="arabicPeriod"/>
-            </a:pPr>
-            <a:r>
-              <a:rPr lang="en-US" smtClean="0"/>
-              <a:t>Xây dựng hệ </a:t>
-            </a:r>
-            <a:r>
-              <a:rPr lang="en-US" smtClean="0"/>
-              <a:t>thống dẫn đường thời gian thực</a:t>
-            </a:r>
-          </a:p>
-          <a:p>
-            <a:pPr marL="514350" indent="-514350">
-              <a:buAutoNum type="arabicPeriod"/>
-            </a:pPr>
-            <a:r>
-              <a:rPr lang="en-US" smtClean="0"/>
-              <a:t>Xây dựng ứng dụng dẫn đường trên Android</a:t>
-            </a:r>
-            <a:endParaRPr lang="en-US" smtClean="0"/>
-          </a:p>
-        </p:txBody>
-      </p:sp>
-      <p:sp>
-        <p:nvSpPr>
-          <p:cNvPr id="6" name="Footer Placeholder 5"/>
-          <p:cNvSpPr>
-            <a:spLocks noGrp="1"/>
-          </p:cNvSpPr>
-          <p:nvPr>
-            <p:ph type="ftr" sz="quarter" idx="11"/>
-          </p:nvPr>
-        </p:nvSpPr>
-        <p:spPr/>
-        <p:txBody>
-          <a:bodyPr/>
-          <a:lstStyle/>
-          <a:p>
-            <a:r>
-              <a:rPr lang="vi-VN" smtClean="0"/>
-              <a:t>Lưu Văn Diệp - Đề cương cao học</a:t>
-            </a:r>
-            <a:endParaRPr lang="en-US"/>
-          </a:p>
-        </p:txBody>
-      </p:sp>
-      <p:sp>
-        <p:nvSpPr>
-          <p:cNvPr id="7" name="Slide Number Placeholder 6"/>
-          <p:cNvSpPr>
-            <a:spLocks noGrp="1"/>
-          </p:cNvSpPr>
-          <p:nvPr>
-            <p:ph type="sldNum" sz="quarter" idx="12"/>
-          </p:nvPr>
-        </p:nvSpPr>
-        <p:spPr/>
-        <p:txBody>
-          <a:bodyPr/>
-          <a:lstStyle/>
-          <a:p>
-            <a:fld id="{B6F15528-21DE-4FAA-801E-634DDDAF4B2B}" type="slidenum">
-              <a:rPr lang="en-US" smtClean="0"/>
-              <a:pPr/>
-              <a:t>9</a:t>
-            </a:fld>
-            <a:endParaRPr lang="en-US"/>
-          </a:p>
-        </p:txBody>
-      </p:sp>
-    </p:spTree>
-    <p:extLst>
-      <p:ext uri="{BB962C8B-B14F-4D97-AF65-F5344CB8AC3E}">
-        <p14:creationId xmlns:p14="http://schemas.microsoft.com/office/powerpoint/2010/main" val="1145428285"/>
       </p:ext>
     </p:extLst>
   </p:cSld>
@@ -8170,4 +8873,47 @@
   <a:objectDefaults/>
   <a:extraClrSchemeLst/>
 </a:theme>
+</file>
+
+<file path=ppt/theme/themeOverride1.xml><?xml version="1.0" encoding="utf-8"?>
+<a:themeOverride xmlns:a="http://schemas.openxmlformats.org/drawingml/2006/main">
+  <a:clrScheme name="Office">
+    <a:dk1>
+      <a:sysClr val="windowText" lastClr="000000"/>
+    </a:dk1>
+    <a:lt1>
+      <a:sysClr val="window" lastClr="FFFFFF"/>
+    </a:lt1>
+    <a:dk2>
+      <a:srgbClr val="1F497D"/>
+    </a:dk2>
+    <a:lt2>
+      <a:srgbClr val="EEECE1"/>
+    </a:lt2>
+    <a:accent1>
+      <a:srgbClr val="4F81BD"/>
+    </a:accent1>
+    <a:accent2>
+      <a:srgbClr val="C0504D"/>
+    </a:accent2>
+    <a:accent3>
+      <a:srgbClr val="9BBB59"/>
+    </a:accent3>
+    <a:accent4>
+      <a:srgbClr val="8064A2"/>
+    </a:accent4>
+    <a:accent5>
+      <a:srgbClr val="4BACC6"/>
+    </a:accent5>
+    <a:accent6>
+      <a:srgbClr val="F79646"/>
+    </a:accent6>
+    <a:hlink>
+      <a:srgbClr val="0000FF"/>
+    </a:hlink>
+    <a:folHlink>
+      <a:srgbClr val="800080"/>
+    </a:folHlink>
+  </a:clrScheme>
+</a:themeOverride>
 </file>
</xml_diff>